<commit_message>
change tables of webapp-ideas
</commit_message>
<xml_diff>
--- a/webapp-ideas/Presentation_ComeAppWith.pptx
+++ b/webapp-ideas/Presentation_ComeAppWith.pptx
@@ -107,6 +107,11 @@
       </a:defRPr>
     </a:lvl9pPr>
   </p:defaultTextStyle>
+  <p:extLst>
+    <p:ext uri="{EFAFB233-063F-42B5-8137-9DF3F51BA10A}">
+      <p15:sldGuideLst xmlns:p15="http://schemas.microsoft.com/office/powerpoint/2012/main"/>
+    </p:ext>
+  </p:extLst>
 </p:presentation>
 </file>
 
@@ -4079,103 +4084,6 @@
           </a:p>
         </p:txBody>
       </p:sp>
-      <mc:AlternateContent xmlns:mc="http://schemas.openxmlformats.org/markup-compatibility/2006">
-        <mc:Choice xmlns:pslz="http://schemas.microsoft.com/office/powerpoint/2016/slidezoom" Requires="pslz">
-          <p:graphicFrame>
-            <p:nvGraphicFramePr>
-              <p:cNvPr id="8" name="スライド ズーム 7">
-                <a:extLst>
-                  <a:ext uri="{FF2B5EF4-FFF2-40B4-BE49-F238E27FC236}">
-                    <a16:creationId xmlns:a16="http://schemas.microsoft.com/office/drawing/2014/main" id="{BF78EA24-F577-F31E-8BD0-D94F9960234E}"/>
-                  </a:ext>
-                </a:extLst>
-              </p:cNvPr>
-              <p:cNvGraphicFramePr>
-                <a:graphicFrameLocks noChangeAspect="1"/>
-              </p:cNvGraphicFramePr>
-              <p:nvPr>
-                <p:extLst>
-                  <p:ext uri="{D42A27DB-BD31-4B8C-83A1-F6EECF244321}">
-                    <p14:modId xmlns:p14="http://schemas.microsoft.com/office/powerpoint/2010/main" val="2963615784"/>
-                  </p:ext>
-                </p:extLst>
-              </p:nvPr>
-            </p:nvGraphicFramePr>
-            <p:xfrm>
-              <a:off x="3769360" y="2180590"/>
-              <a:ext cx="3048000" cy="1714500"/>
-            </p:xfrm>
-            <a:graphic>
-              <a:graphicData uri="http://schemas.microsoft.com/office/powerpoint/2016/slidezoom">
-                <pslz:sldZm>
-                  <pslz:sldZmObj sldId="257" cId="879530357">
-                    <pslz:zmPr id="{23F1BF45-4599-4C69-B8F3-E1FA01814CC4}" returnToParent="0" transitionDur="1000">
-                      <p166:blipFill xmlns:p166="http://schemas.microsoft.com/office/powerpoint/2016/6/main">
-                        <a:blip r:embed="rId3"/>
-                        <a:stretch>
-                          <a:fillRect/>
-                        </a:stretch>
-                      </p166:blipFill>
-                      <p166:spPr xmlns:p166="http://schemas.microsoft.com/office/powerpoint/2016/6/main">
-                        <a:xfrm>
-                          <a:off x="0" y="0"/>
-                          <a:ext cx="3048000" cy="1714500"/>
-                        </a:xfrm>
-                        <a:prstGeom prst="rect">
-                          <a:avLst/>
-                        </a:prstGeom>
-                        <a:ln w="3175">
-                          <a:solidFill>
-                            <a:prstClr val="ltGray"/>
-                          </a:solidFill>
-                        </a:ln>
-                      </p166:spPr>
-                    </pslz:zmPr>
-                  </pslz:sldZmObj>
-                </pslz:sldZm>
-              </a:graphicData>
-            </a:graphic>
-          </p:graphicFrame>
-        </mc:Choice>
-        <mc:Fallback>
-          <p:pic>
-            <p:nvPicPr>
-              <p:cNvPr id="8" name="スライド ズーム 7">
-                <a:hlinkClick r:id="rId4" action="ppaction://hlinksldjump"/>
-                <a:extLst>
-                  <a:ext uri="{FF2B5EF4-FFF2-40B4-BE49-F238E27FC236}">
-                    <a16:creationId xmlns:a16="http://schemas.microsoft.com/office/drawing/2014/main" id="{BF78EA24-F577-F31E-8BD0-D94F9960234E}"/>
-                  </a:ext>
-                </a:extLst>
-              </p:cNvPr>
-              <p:cNvPicPr>
-                <a:picLocks noGrp="1" noRot="1" noChangeAspect="1" noMove="1" noResize="1" noEditPoints="1" noAdjustHandles="1" noChangeArrowheads="1" noChangeShapeType="1"/>
-              </p:cNvPicPr>
-              <p:nvPr/>
-            </p:nvPicPr>
-            <p:blipFill>
-              <a:blip r:embed="rId3"/>
-              <a:stretch>
-                <a:fillRect/>
-              </a:stretch>
-            </p:blipFill>
-            <p:spPr>
-              <a:xfrm>
-                <a:off x="3769360" y="2180590"/>
-                <a:ext cx="3048000" cy="1714500"/>
-              </a:xfrm>
-              <a:prstGeom prst="rect">
-                <a:avLst/>
-              </a:prstGeom>
-              <a:ln w="3175">
-                <a:solidFill>
-                  <a:prstClr val="ltGray"/>
-                </a:solidFill>
-              </a:ln>
-            </p:spPr>
-          </p:pic>
-        </mc:Fallback>
-      </mc:AlternateContent>
     </p:spTree>
     <p:extLst>
       <p:ext uri="{BB962C8B-B14F-4D97-AF65-F5344CB8AC3E}">

</xml_diff>